<commit_message>
chore: changed the image size for apo project
</commit_message>
<xml_diff>
--- a/frontend-ts-app/public/before&after template.pptx
+++ b/frontend-ts-app/public/before&after template.pptx
@@ -6110,7 +6110,7 @@
         </p:nvSpPr>
         <p:spPr>
           <a:xfrm>
-            <a:off x="2654768" y="5850514"/>
+            <a:off x="2391398" y="5948372"/>
             <a:ext cx="1815655" cy="369332"/>
           </a:xfrm>
           <a:prstGeom prst="rect">
@@ -6140,7 +6140,7 @@
         </p:nvSpPr>
         <p:spPr>
           <a:xfrm>
-            <a:off x="7869706" y="5786651"/>
+            <a:off x="8907585" y="5948372"/>
             <a:ext cx="1815655" cy="369332"/>
           </a:xfrm>
           <a:prstGeom prst="rect">
@@ -6164,7 +6164,7 @@
       </p:sp>
       <p:pic>
         <p:nvPicPr>
-          <p:cNvPr id="6" name="Picture 5"/>
+          <p:cNvPr id="2" name="Picture 1"/>
           <p:cNvPicPr>
             <a:picLocks noChangeAspect="1"/>
           </p:cNvPicPr>
@@ -6184,8 +6184,8 @@
         </p:blipFill>
         <p:spPr>
           <a:xfrm>
-            <a:off x="6110928" y="1815153"/>
-            <a:ext cx="4650332" cy="3971498"/>
+            <a:off x="0" y="1565395"/>
+            <a:ext cx="6324600" cy="4198311"/>
           </a:xfrm>
           <a:prstGeom prst="rect">
             <a:avLst/>
@@ -6194,7 +6194,7 @@
       </p:pic>
       <p:pic>
         <p:nvPicPr>
-          <p:cNvPr id="7" name="Picture 6"/>
+          <p:cNvPr id="3" name="Picture 2"/>
           <p:cNvPicPr>
             <a:picLocks noChangeAspect="1"/>
           </p:cNvPicPr>
@@ -6214,8 +6214,8 @@
         </p:blipFill>
         <p:spPr>
           <a:xfrm>
-            <a:off x="873456" y="1790725"/>
-            <a:ext cx="4922095" cy="3995926"/>
+            <a:off x="6324600" y="1565394"/>
+            <a:ext cx="5867400" cy="4198311"/>
           </a:xfrm>
           <a:prstGeom prst="rect">
             <a:avLst/>

</xml_diff>

<commit_message>
feat: added a project
</commit_message>
<xml_diff>
--- a/frontend-ts-app/public/before&after template.pptx
+++ b/frontend-ts-app/public/before&after template.pptx
@@ -6110,7 +6110,7 @@
         </p:nvSpPr>
         <p:spPr>
           <a:xfrm>
-            <a:off x="2391398" y="5948372"/>
+            <a:off x="2587341" y="5073188"/>
             <a:ext cx="1815655" cy="369332"/>
           </a:xfrm>
           <a:prstGeom prst="rect">
@@ -6140,7 +6140,7 @@
         </p:nvSpPr>
         <p:spPr>
           <a:xfrm>
-            <a:off x="8907585" y="5948372"/>
+            <a:off x="8874928" y="5073188"/>
             <a:ext cx="1815655" cy="369332"/>
           </a:xfrm>
           <a:prstGeom prst="rect">
@@ -6184,8 +6184,8 @@
         </p:blipFill>
         <p:spPr>
           <a:xfrm>
-            <a:off x="0" y="1565395"/>
-            <a:ext cx="6324600" cy="4198311"/>
+            <a:off x="1" y="2525486"/>
+            <a:ext cx="6204856" cy="2394857"/>
           </a:xfrm>
           <a:prstGeom prst="rect">
             <a:avLst/>
@@ -6214,8 +6214,8 @@
         </p:blipFill>
         <p:spPr>
           <a:xfrm>
-            <a:off x="6324600" y="1565394"/>
-            <a:ext cx="5867400" cy="4198311"/>
+            <a:off x="6204857" y="2525486"/>
+            <a:ext cx="5987143" cy="2394857"/>
           </a:xfrm>
           <a:prstGeom prst="rect">
             <a:avLst/>

</xml_diff>